<commit_message>
Directories for 3rd quarter added
</commit_message>
<xml_diff>
--- a/econ_711b/ps6_vonhafften_gametree.pptx
+++ b/econ_711b/ps6_vonhafften_gametree.pptx
@@ -3497,7 +3497,7 @@
         <p:spPr>
           <a:xfrm>
             <a:off x="5018317" y="4643062"/>
-            <a:ext cx="408060" cy="369332"/>
+            <a:ext cx="341760" cy="369332"/>
           </a:xfrm>
           <a:prstGeom prst="rect">
             <a:avLst/>
@@ -3511,12 +3511,12 @@
           <a:lstStyle/>
           <a:p>
             <a:r>
-              <a:rPr lang="en-US" dirty="0" err="1"/>
+              <a:rPr lang="en-US" dirty="0"/>
               <a:t>t</a:t>
             </a:r>
             <a:r>
-              <a:rPr lang="en-US" baseline="-25000" dirty="0" err="1"/>
-              <a:t>kq</a:t>
+              <a:rPr lang="en-US" baseline="-25000" dirty="0"/>
+              <a:t>b</a:t>
             </a:r>
             <a:endParaRPr lang="en-US" dirty="0"/>
           </a:p>
@@ -4421,7 +4421,7 @@
           <a:p>
             <a:r>
               <a:rPr lang="en-US" dirty="0"/>
-              <a:t>-1, 1</a:t>
+              <a:t>1, -1</a:t>
             </a:r>
           </a:p>
         </p:txBody>
@@ -4491,13 +4491,64 @@
           <a:p>
             <a:r>
               <a:rPr lang="en-US" dirty="0"/>
-              <a:t>2</a:t>
-            </a:r>
-            <a:r>
-              <a:rPr lang="en-US"/>
-              <a:t>, -2</a:t>
-            </a:r>
-            <a:endParaRPr lang="en-US" dirty="0"/>
+              <a:t>-2, 2</a:t>
+            </a:r>
+          </a:p>
+        </p:txBody>
+      </p:sp>
+      <p:sp>
+        <p:nvSpPr>
+          <p:cNvPr id="41" name="Rectangle 40">
+            <a:extLst>
+              <a:ext uri="{FF2B5EF4-FFF2-40B4-BE49-F238E27FC236}">
+                <a16:creationId xmlns:a16="http://schemas.microsoft.com/office/drawing/2014/main" id="{97B07F50-09EE-FE4B-904D-6EADED5ED38A}"/>
+              </a:ext>
+            </a:extLst>
+          </p:cNvPr>
+          <p:cNvSpPr/>
+          <p:nvPr/>
+        </p:nvSpPr>
+        <p:spPr>
+          <a:xfrm>
+            <a:off x="6771925" y="1104355"/>
+            <a:ext cx="301686" cy="3908039"/>
+          </a:xfrm>
+          <a:prstGeom prst="rect">
+            <a:avLst/>
+          </a:prstGeom>
+          <a:solidFill>
+            <a:schemeClr val="accent1">
+              <a:alpha val="0"/>
+            </a:schemeClr>
+          </a:solidFill>
+          <a:ln w="25400">
+            <a:solidFill>
+              <a:schemeClr val="tx1"/>
+            </a:solidFill>
+          </a:ln>
+        </p:spPr>
+        <p:style>
+          <a:lnRef idx="2">
+            <a:schemeClr val="accent1">
+              <a:shade val="50000"/>
+            </a:schemeClr>
+          </a:lnRef>
+          <a:fillRef idx="1">
+            <a:schemeClr val="accent1"/>
+          </a:fillRef>
+          <a:effectRef idx="0">
+            <a:schemeClr val="accent1"/>
+          </a:effectRef>
+          <a:fontRef idx="minor">
+            <a:schemeClr val="lt1"/>
+          </a:fontRef>
+        </p:style>
+        <p:txBody>
+          <a:bodyPr rtlCol="0" anchor="ctr"/>
+          <a:lstStyle/>
+          <a:p>
+            <a:pPr algn="ctr"/>
+            <a:endParaRPr lang="en-US"/>
           </a:p>
         </p:txBody>
       </p:sp>

</xml_diff>